<commit_message>
preprocess with previous data
</commit_message>
<xml_diff>
--- a/model.pptx
+++ b/model.pptx
@@ -5,9 +5,8 @@
     <p:sldMasterId id="2147483648" r:id="rId1"/>
   </p:sldMasterIdLst>
   <p:sldIdLst>
-    <p:sldId id="257" r:id="rId2"/>
-    <p:sldId id="259" r:id="rId3"/>
-    <p:sldId id="260" r:id="rId4"/>
+    <p:sldId id="259" r:id="rId2"/>
+    <p:sldId id="260" r:id="rId3"/>
   </p:sldIdLst>
   <p:sldSz cx="12192000" cy="6858000"/>
   <p:notesSz cx="6858000" cy="9144000"/>
@@ -261,7 +260,7 @@
           <a:p>
             <a:fld id="{1782301E-220B-46AC-AA82-1EE4BEA83DFF}" type="datetimeFigureOut">
               <a:rPr lang="ko-KR" altLang="en-US" smtClean="0"/>
-              <a:t>2021-06-11</a:t>
+              <a:t>2021-07-14</a:t>
             </a:fld>
             <a:endParaRPr lang="ko-KR" altLang="en-US"/>
           </a:p>
@@ -459,7 +458,7 @@
           <a:p>
             <a:fld id="{1782301E-220B-46AC-AA82-1EE4BEA83DFF}" type="datetimeFigureOut">
               <a:rPr lang="ko-KR" altLang="en-US" smtClean="0"/>
-              <a:t>2021-06-11</a:t>
+              <a:t>2021-07-14</a:t>
             </a:fld>
             <a:endParaRPr lang="ko-KR" altLang="en-US"/>
           </a:p>
@@ -667,7 +666,7 @@
           <a:p>
             <a:fld id="{1782301E-220B-46AC-AA82-1EE4BEA83DFF}" type="datetimeFigureOut">
               <a:rPr lang="ko-KR" altLang="en-US" smtClean="0"/>
-              <a:t>2021-06-11</a:t>
+              <a:t>2021-07-14</a:t>
             </a:fld>
             <a:endParaRPr lang="ko-KR" altLang="en-US"/>
           </a:p>
@@ -865,7 +864,7 @@
           <a:p>
             <a:fld id="{1782301E-220B-46AC-AA82-1EE4BEA83DFF}" type="datetimeFigureOut">
               <a:rPr lang="ko-KR" altLang="en-US" smtClean="0"/>
-              <a:t>2021-06-11</a:t>
+              <a:t>2021-07-14</a:t>
             </a:fld>
             <a:endParaRPr lang="ko-KR" altLang="en-US"/>
           </a:p>
@@ -1140,7 +1139,7 @@
           <a:p>
             <a:fld id="{1782301E-220B-46AC-AA82-1EE4BEA83DFF}" type="datetimeFigureOut">
               <a:rPr lang="ko-KR" altLang="en-US" smtClean="0"/>
-              <a:t>2021-06-11</a:t>
+              <a:t>2021-07-14</a:t>
             </a:fld>
             <a:endParaRPr lang="ko-KR" altLang="en-US"/>
           </a:p>
@@ -1405,7 +1404,7 @@
           <a:p>
             <a:fld id="{1782301E-220B-46AC-AA82-1EE4BEA83DFF}" type="datetimeFigureOut">
               <a:rPr lang="ko-KR" altLang="en-US" smtClean="0"/>
-              <a:t>2021-06-11</a:t>
+              <a:t>2021-07-14</a:t>
             </a:fld>
             <a:endParaRPr lang="ko-KR" altLang="en-US"/>
           </a:p>
@@ -1817,7 +1816,7 @@
           <a:p>
             <a:fld id="{1782301E-220B-46AC-AA82-1EE4BEA83DFF}" type="datetimeFigureOut">
               <a:rPr lang="ko-KR" altLang="en-US" smtClean="0"/>
-              <a:t>2021-06-11</a:t>
+              <a:t>2021-07-14</a:t>
             </a:fld>
             <a:endParaRPr lang="ko-KR" altLang="en-US"/>
           </a:p>
@@ -1958,7 +1957,7 @@
           <a:p>
             <a:fld id="{1782301E-220B-46AC-AA82-1EE4BEA83DFF}" type="datetimeFigureOut">
               <a:rPr lang="ko-KR" altLang="en-US" smtClean="0"/>
-              <a:t>2021-06-11</a:t>
+              <a:t>2021-07-14</a:t>
             </a:fld>
             <a:endParaRPr lang="ko-KR" altLang="en-US"/>
           </a:p>
@@ -2071,7 +2070,7 @@
           <a:p>
             <a:fld id="{1782301E-220B-46AC-AA82-1EE4BEA83DFF}" type="datetimeFigureOut">
               <a:rPr lang="ko-KR" altLang="en-US" smtClean="0"/>
-              <a:t>2021-06-11</a:t>
+              <a:t>2021-07-14</a:t>
             </a:fld>
             <a:endParaRPr lang="ko-KR" altLang="en-US"/>
           </a:p>
@@ -2382,7 +2381,7 @@
           <a:p>
             <a:fld id="{1782301E-220B-46AC-AA82-1EE4BEA83DFF}" type="datetimeFigureOut">
               <a:rPr lang="ko-KR" altLang="en-US" smtClean="0"/>
-              <a:t>2021-06-11</a:t>
+              <a:t>2021-07-14</a:t>
             </a:fld>
             <a:endParaRPr lang="ko-KR" altLang="en-US"/>
           </a:p>
@@ -2670,7 +2669,7 @@
           <a:p>
             <a:fld id="{1782301E-220B-46AC-AA82-1EE4BEA83DFF}" type="datetimeFigureOut">
               <a:rPr lang="ko-KR" altLang="en-US" smtClean="0"/>
-              <a:t>2021-06-11</a:t>
+              <a:t>2021-07-14</a:t>
             </a:fld>
             <a:endParaRPr lang="ko-KR" altLang="en-US"/>
           </a:p>
@@ -2911,7 +2910,7 @@
           <a:p>
             <a:fld id="{1782301E-220B-46AC-AA82-1EE4BEA83DFF}" type="datetimeFigureOut">
               <a:rPr lang="ko-KR" altLang="en-US" smtClean="0"/>
-              <a:t>2021-06-11</a:t>
+              <a:t>2021-07-14</a:t>
             </a:fld>
             <a:endParaRPr lang="ko-KR" altLang="en-US"/>
           </a:p>
@@ -3333,7 +3332,7 @@
           <p:cNvPr id="2" name="제목 1">
             <a:extLst>
               <a:ext uri="{FF2B5EF4-FFF2-40B4-BE49-F238E27FC236}">
-                <a16:creationId xmlns:a16="http://schemas.microsoft.com/office/drawing/2014/main" id="{A6E2B090-400A-433C-8E4A-29EC014A1B10}"/>
+                <a16:creationId xmlns:a16="http://schemas.microsoft.com/office/drawing/2014/main" id="{C6A3D836-AAA3-47F4-8567-DE568CEF9713}"/>
               </a:ext>
             </a:extLst>
           </p:cNvPr>
@@ -3351,7 +3350,7 @@
           <a:p>
             <a:r>
               <a:rPr lang="en-US" altLang="ko-KR" dirty="0"/>
-              <a:t>Normalize data</a:t>
+              <a:t>Method</a:t>
             </a:r>
             <a:endParaRPr lang="ko-KR" altLang="en-US" dirty="0"/>
           </a:p>
@@ -3362,7 +3361,7 @@
           <p:cNvPr id="3" name="내용 개체 틀 2">
             <a:extLst>
               <a:ext uri="{FF2B5EF4-FFF2-40B4-BE49-F238E27FC236}">
-                <a16:creationId xmlns:a16="http://schemas.microsoft.com/office/drawing/2014/main" id="{CA1B057B-DEF7-4F89-9959-864924A8D2B6}"/>
+                <a16:creationId xmlns:a16="http://schemas.microsoft.com/office/drawing/2014/main" id="{05E33C31-FA73-4AE9-8B31-530D0E521CAE}"/>
               </a:ext>
             </a:extLst>
           </p:cNvPr>
@@ -3373,35 +3372,198 @@
             <p:ph idx="1"/>
           </p:nvPr>
         </p:nvSpPr>
-        <p:spPr/>
+        <p:spPr>
+          <a:xfrm>
+            <a:off x="419819" y="1877383"/>
+            <a:ext cx="4976004" cy="4350888"/>
+          </a:xfrm>
+        </p:spPr>
         <p:txBody>
           <a:bodyPr/>
           <a:lstStyle/>
           <a:p>
             <a:r>
+              <a:rPr lang="en-US" altLang="ko-KR" dirty="0"/>
+              <a:t>Channel</a:t>
+            </a:r>
+            <a:r>
               <a:rPr lang="ko-KR" altLang="en-US" dirty="0"/>
-              <a:t>특정 </a:t>
+              <a:t> 하나당 </a:t>
             </a:r>
             <a:r>
               <a:rPr lang="en-US" altLang="ko-KR" dirty="0"/>
-              <a:t>period </a:t>
+              <a:t>matrix </a:t>
             </a:r>
             <a:r>
               <a:rPr lang="ko-KR" altLang="en-US" dirty="0"/>
-              <a:t>동안의 </a:t>
+              <a:t>하나를 만들 수 있습니다</a:t>
             </a:r>
             <a:r>
               <a:rPr lang="en-US" altLang="ko-KR" dirty="0"/>
-              <a:t>data</a:t>
+              <a:t>.</a:t>
+            </a:r>
+          </a:p>
+          <a:p>
+            <a:endParaRPr lang="en-US" altLang="ko-KR" dirty="0"/>
+          </a:p>
+          <a:p>
+            <a:r>
+              <a:rPr lang="ko-KR" altLang="en-US" dirty="0"/>
+              <a:t>새로 들어 오는 </a:t>
+            </a:r>
+            <a:r>
+              <a:rPr lang="en-US" altLang="ko-KR" dirty="0"/>
+              <a:t>dataset</a:t>
+            </a:r>
+            <a:r>
+              <a:rPr lang="ko-KR" altLang="en-US" dirty="0"/>
+              <a:t>으로 </a:t>
+            </a:r>
+            <a:r>
+              <a:rPr lang="en-US" altLang="ko-KR" dirty="0"/>
+              <a:t>gradient descent</a:t>
+            </a:r>
+            <a:r>
+              <a:rPr lang="ko-KR" altLang="en-US" dirty="0"/>
+              <a:t>를 수행해서 </a:t>
+            </a:r>
+            <a:r>
+              <a:rPr lang="en-US" altLang="ko-KR" dirty="0"/>
+              <a:t>factor matrix</a:t>
+            </a:r>
+            <a:r>
+              <a:rPr lang="ko-KR" altLang="en-US" dirty="0"/>
+              <a:t>를 </a:t>
+            </a:r>
+            <a:r>
+              <a:rPr lang="en-US" altLang="ko-KR" dirty="0"/>
+              <a:t>update </a:t>
+            </a:r>
+            <a:r>
+              <a:rPr lang="ko-KR" altLang="en-US" dirty="0"/>
+              <a:t>수행</a:t>
+            </a:r>
+            <a:r>
+              <a:rPr lang="en-US" altLang="ko-KR" dirty="0"/>
+              <a:t>.</a:t>
             </a:r>
             <a:endParaRPr lang="ko-KR" altLang="en-US" dirty="0"/>
           </a:p>
         </p:txBody>
       </p:sp>
+      <p:grpSp>
+        <p:nvGrpSpPr>
+          <p:cNvPr id="6" name="그룹 5">
+            <a:extLst>
+              <a:ext uri="{FF2B5EF4-FFF2-40B4-BE49-F238E27FC236}">
+                <a16:creationId xmlns:a16="http://schemas.microsoft.com/office/drawing/2014/main" id="{3DC28F18-F12D-4F6B-BFB5-CFAB05DB9880}"/>
+              </a:ext>
+            </a:extLst>
+          </p:cNvPr>
+          <p:cNvGrpSpPr/>
+          <p:nvPr/>
+        </p:nvGrpSpPr>
+        <p:grpSpPr>
+          <a:xfrm>
+            <a:off x="5503653" y="3787117"/>
+            <a:ext cx="6359105" cy="2971193"/>
+            <a:chOff x="4763218" y="3128864"/>
+            <a:chExt cx="6359105" cy="2971193"/>
+          </a:xfrm>
+        </p:grpSpPr>
+        <p:pic>
+          <p:nvPicPr>
+            <p:cNvPr id="4" name="그림 3">
+              <a:extLst>
+                <a:ext uri="{FF2B5EF4-FFF2-40B4-BE49-F238E27FC236}">
+                  <a16:creationId xmlns:a16="http://schemas.microsoft.com/office/drawing/2014/main" id="{46FCF56A-B1D7-463D-BE73-01014422E08F}"/>
+                </a:ext>
+              </a:extLst>
+            </p:cNvPr>
+            <p:cNvPicPr>
+              <a:picLocks noChangeAspect="1"/>
+            </p:cNvPicPr>
+            <p:nvPr/>
+          </p:nvPicPr>
+          <p:blipFill rotWithShape="1">
+            <a:blip r:embed="rId2"/>
+            <a:srcRect r="46782"/>
+            <a:stretch/>
+          </p:blipFill>
+          <p:spPr>
+            <a:xfrm>
+              <a:off x="4763218" y="3197875"/>
+              <a:ext cx="4070230" cy="2902182"/>
+            </a:xfrm>
+            <a:prstGeom prst="rect">
+              <a:avLst/>
+            </a:prstGeom>
+          </p:spPr>
+        </p:pic>
+        <p:pic>
+          <p:nvPicPr>
+            <p:cNvPr id="5" name="그림 4">
+              <a:extLst>
+                <a:ext uri="{FF2B5EF4-FFF2-40B4-BE49-F238E27FC236}">
+                  <a16:creationId xmlns:a16="http://schemas.microsoft.com/office/drawing/2014/main" id="{8C048A59-852D-406B-8E0D-8D7BA1DCDBC3}"/>
+                </a:ext>
+              </a:extLst>
+            </p:cNvPr>
+            <p:cNvPicPr>
+              <a:picLocks noChangeAspect="1"/>
+            </p:cNvPicPr>
+            <p:nvPr/>
+          </p:nvPicPr>
+          <p:blipFill rotWithShape="1">
+            <a:blip r:embed="rId2"/>
+            <a:srcRect l="72893"/>
+            <a:stretch/>
+          </p:blipFill>
+          <p:spPr>
+            <a:xfrm>
+              <a:off x="9049108" y="3128864"/>
+              <a:ext cx="2073215" cy="2902182"/>
+            </a:xfrm>
+            <a:prstGeom prst="rect">
+              <a:avLst/>
+            </a:prstGeom>
+          </p:spPr>
+        </p:pic>
+      </p:grpSp>
+      <p:pic>
+        <p:nvPicPr>
+          <p:cNvPr id="7" name="그림 6">
+            <a:extLst>
+              <a:ext uri="{FF2B5EF4-FFF2-40B4-BE49-F238E27FC236}">
+                <a16:creationId xmlns:a16="http://schemas.microsoft.com/office/drawing/2014/main" id="{9F63F731-2001-4CC9-BAB4-B76973CFCCF0}"/>
+              </a:ext>
+            </a:extLst>
+          </p:cNvPr>
+          <p:cNvPicPr>
+            <a:picLocks noChangeAspect="1"/>
+          </p:cNvPicPr>
+          <p:nvPr/>
+        </p:nvPicPr>
+        <p:blipFill>
+          <a:blip r:embed="rId3"/>
+          <a:stretch>
+            <a:fillRect/>
+          </a:stretch>
+        </p:blipFill>
+        <p:spPr>
+          <a:xfrm>
+            <a:off x="6445368" y="365125"/>
+            <a:ext cx="4977442" cy="3421992"/>
+          </a:xfrm>
+          <a:prstGeom prst="rect">
+            <a:avLst/>
+          </a:prstGeom>
+        </p:spPr>
+      </p:pic>
     </p:spTree>
     <p:extLst>
       <p:ext uri="{BB962C8B-B14F-4D97-AF65-F5344CB8AC3E}">
-        <p14:creationId xmlns:p14="http://schemas.microsoft.com/office/powerpoint/2010/main" val="3927296870"/>
+        <p14:creationId xmlns:p14="http://schemas.microsoft.com/office/powerpoint/2010/main" val="1925497421"/>
       </p:ext>
     </p:extLst>
   </p:cSld>
@@ -3412,154 +3574,6 @@
 </file>
 
 <file path=ppt/slides/slide2.xml><?xml version="1.0" encoding="utf-8"?>
-<p:sld xmlns:a="http://schemas.openxmlformats.org/drawingml/2006/main" xmlns:r="http://schemas.openxmlformats.org/officeDocument/2006/relationships" xmlns:p="http://schemas.openxmlformats.org/presentationml/2006/main">
-  <p:cSld>
-    <p:spTree>
-      <p:nvGrpSpPr>
-        <p:cNvPr id="1" name=""/>
-        <p:cNvGrpSpPr/>
-        <p:nvPr/>
-      </p:nvGrpSpPr>
-      <p:grpSpPr>
-        <a:xfrm>
-          <a:off x="0" y="0"/>
-          <a:ext cx="0" cy="0"/>
-          <a:chOff x="0" y="0"/>
-          <a:chExt cx="0" cy="0"/>
-        </a:xfrm>
-      </p:grpSpPr>
-      <p:sp>
-        <p:nvSpPr>
-          <p:cNvPr id="2" name="제목 1">
-            <a:extLst>
-              <a:ext uri="{FF2B5EF4-FFF2-40B4-BE49-F238E27FC236}">
-                <a16:creationId xmlns:a16="http://schemas.microsoft.com/office/drawing/2014/main" id="{E91694C9-2256-4861-9F3B-C6CCE5A82DDB}"/>
-              </a:ext>
-            </a:extLst>
-          </p:cNvPr>
-          <p:cNvSpPr>
-            <a:spLocks noGrp="1"/>
-          </p:cNvSpPr>
-          <p:nvPr>
-            <p:ph type="title"/>
-          </p:nvPr>
-        </p:nvSpPr>
-        <p:spPr/>
-        <p:txBody>
-          <a:bodyPr/>
-          <a:lstStyle/>
-          <a:p>
-            <a:r>
-              <a:rPr lang="en-US" altLang="ko-KR" dirty="0"/>
-              <a:t>Initialization step</a:t>
-            </a:r>
-            <a:endParaRPr lang="ko-KR" altLang="en-US" dirty="0"/>
-          </a:p>
-        </p:txBody>
-      </p:sp>
-      <p:sp>
-        <p:nvSpPr>
-          <p:cNvPr id="3" name="내용 개체 틀 2">
-            <a:extLst>
-              <a:ext uri="{FF2B5EF4-FFF2-40B4-BE49-F238E27FC236}">
-                <a16:creationId xmlns:a16="http://schemas.microsoft.com/office/drawing/2014/main" id="{04FA33B4-2BDE-43F3-B036-1994ED232485}"/>
-              </a:ext>
-            </a:extLst>
-          </p:cNvPr>
-          <p:cNvSpPr>
-            <a:spLocks noGrp="1"/>
-          </p:cNvSpPr>
-          <p:nvPr>
-            <p:ph idx="1"/>
-          </p:nvPr>
-        </p:nvSpPr>
-        <p:spPr/>
-        <p:txBody>
-          <a:bodyPr/>
-          <a:lstStyle/>
-          <a:p>
-            <a:r>
-              <a:rPr lang="ko-KR" altLang="en-US" dirty="0"/>
-              <a:t>그냥 </a:t>
-            </a:r>
-            <a:r>
-              <a:rPr lang="en-US" altLang="ko-KR" dirty="0"/>
-              <a:t>window</a:t>
-            </a:r>
-            <a:r>
-              <a:rPr lang="ko-KR" altLang="en-US" dirty="0"/>
-              <a:t>에서 마지막 </a:t>
-            </a:r>
-            <a:r>
-              <a:rPr lang="en-US" altLang="ko-KR" dirty="0"/>
-              <a:t>time stamp</a:t>
-            </a:r>
-            <a:r>
-              <a:rPr lang="ko-KR" altLang="en-US" dirty="0"/>
-              <a:t>의 </a:t>
-            </a:r>
-            <a:r>
-              <a:rPr lang="en-US" altLang="ko-KR" dirty="0"/>
-              <a:t>matrix</a:t>
-            </a:r>
-            <a:r>
-              <a:rPr lang="ko-KR" altLang="en-US" dirty="0"/>
-              <a:t>를 </a:t>
-            </a:r>
-            <a:r>
-              <a:rPr lang="en-US" altLang="ko-KR" dirty="0"/>
-              <a:t>factorize</a:t>
-            </a:r>
-          </a:p>
-          <a:p>
-            <a:pPr marL="0" indent="0">
-              <a:buNone/>
-            </a:pPr>
-            <a:endParaRPr lang="en-US" altLang="ko-KR" dirty="0"/>
-          </a:p>
-          <a:p>
-            <a:r>
-              <a:rPr lang="ko-KR" altLang="en-US" dirty="0"/>
-              <a:t>마지막 </a:t>
-            </a:r>
-            <a:r>
-              <a:rPr lang="en-US" altLang="ko-KR" dirty="0"/>
-              <a:t>time step</a:t>
-            </a:r>
-            <a:r>
-              <a:rPr lang="ko-KR" altLang="en-US" dirty="0"/>
-              <a:t>의 </a:t>
-            </a:r>
-            <a:r>
-              <a:rPr lang="en-US" altLang="ko-KR" dirty="0"/>
-              <a:t>p, q, lambda</a:t>
-            </a:r>
-            <a:r>
-              <a:rPr lang="ko-KR" altLang="en-US" dirty="0"/>
-              <a:t>를 들고 오자</a:t>
-            </a:r>
-            <a:r>
-              <a:rPr lang="en-US" altLang="ko-KR" dirty="0"/>
-              <a:t>.</a:t>
-            </a:r>
-            <a:endParaRPr lang="ko-KR" altLang="en-US" dirty="0"/>
-          </a:p>
-        </p:txBody>
-      </p:sp>
-    </p:spTree>
-    <p:extLst>
-      <p:ext uri="{BB962C8B-B14F-4D97-AF65-F5344CB8AC3E}">
-        <p14:creationId xmlns:p14="http://schemas.microsoft.com/office/powerpoint/2010/main" val="1736737099"/>
-      </p:ext>
-    </p:extLst>
-  </p:cSld>
-  <p:clrMapOvr>
-    <a:masterClrMapping/>
-  </p:clrMapOvr>
-</p:sld>
-</file>
-
-<file path=ppt/slides/slide3.xml><?xml version="1.0" encoding="utf-8"?>
 <p:sld xmlns:a="http://schemas.openxmlformats.org/drawingml/2006/main" xmlns:r="http://schemas.openxmlformats.org/officeDocument/2006/relationships" xmlns:p="http://schemas.openxmlformats.org/presentationml/2006/main">
   <p:cSld>
     <p:spTree>
@@ -4155,13 +4169,7 @@
                                     <a:rPr lang="en-US" altLang="ko-KR" b="0" i="1" smtClean="0">
                                       <a:latin typeface="Cambria Math" panose="02040503050406030204" pitchFamily="18" charset="0"/>
                                     </a:rPr>
-                                    <m:t>−</m:t>
-                                  </m:r>
-                                  <m:r>
-                                    <a:rPr lang="en-US" altLang="ko-KR" b="0" i="1" smtClean="0">
-                                      <a:latin typeface="Cambria Math" panose="02040503050406030204" pitchFamily="18" charset="0"/>
-                                    </a:rPr>
-                                    <m:t> </m:t>
+                                    <m:t>− </m:t>
                                   </m:r>
                                   <m:sSub>
                                     <m:sSubPr>

</xml_diff>